<commit_message>
Inicia complemento da especificação - Consulta COVID-19
</commit_message>
<xml_diff>
--- a/static/pagina-inicial-espec-covid19.pptx
+++ b/static/pagina-inicial-espec-covid19.pptx
@@ -5,12 +5,13 @@
     <p:sldMasterId id="2147483648" r:id="rId1"/>
   </p:sldMasterIdLst>
   <p:sldIdLst>
-    <p:sldId id="256" r:id="rId2"/>
-    <p:sldId id="258" r:id="rId3"/>
-    <p:sldId id="260" r:id="rId4"/>
-    <p:sldId id="259" r:id="rId5"/>
-    <p:sldId id="261" r:id="rId6"/>
-    <p:sldId id="262" r:id="rId7"/>
+    <p:sldId id="258" r:id="rId2"/>
+    <p:sldId id="260" r:id="rId3"/>
+    <p:sldId id="259" r:id="rId4"/>
+    <p:sldId id="261" r:id="rId5"/>
+    <p:sldId id="262" r:id="rId6"/>
+    <p:sldId id="263" r:id="rId7"/>
+    <p:sldId id="264" r:id="rId8"/>
   </p:sldIdLst>
   <p:sldSz cx="12192000" cy="6858000"/>
   <p:notesSz cx="6858000" cy="9144000"/>
@@ -274,7 +275,7 @@
           <a:p>
             <a:fld id="{0DAC32FC-DBAC-4007-937A-15B4E69A3744}" type="datetimeFigureOut">
               <a:rPr lang="pt-BR" smtClean="0"/>
-              <a:t>04/06/2020</a:t>
+              <a:t>15/07/2020</a:t>
             </a:fld>
             <a:endParaRPr lang="pt-BR"/>
           </a:p>
@@ -444,7 +445,7 @@
           <a:p>
             <a:fld id="{0DAC32FC-DBAC-4007-937A-15B4E69A3744}" type="datetimeFigureOut">
               <a:rPr lang="pt-BR" smtClean="0"/>
-              <a:t>04/06/2020</a:t>
+              <a:t>15/07/2020</a:t>
             </a:fld>
             <a:endParaRPr lang="pt-BR"/>
           </a:p>
@@ -624,7 +625,7 @@
           <a:p>
             <a:fld id="{0DAC32FC-DBAC-4007-937A-15B4E69A3744}" type="datetimeFigureOut">
               <a:rPr lang="pt-BR" smtClean="0"/>
-              <a:t>04/06/2020</a:t>
+              <a:t>15/07/2020</a:t>
             </a:fld>
             <a:endParaRPr lang="pt-BR"/>
           </a:p>
@@ -794,7 +795,7 @@
           <a:p>
             <a:fld id="{0DAC32FC-DBAC-4007-937A-15B4E69A3744}" type="datetimeFigureOut">
               <a:rPr lang="pt-BR" smtClean="0"/>
-              <a:t>04/06/2020</a:t>
+              <a:t>15/07/2020</a:t>
             </a:fld>
             <a:endParaRPr lang="pt-BR"/>
           </a:p>
@@ -1040,7 +1041,7 @@
           <a:p>
             <a:fld id="{0DAC32FC-DBAC-4007-937A-15B4E69A3744}" type="datetimeFigureOut">
               <a:rPr lang="pt-BR" smtClean="0"/>
-              <a:t>04/06/2020</a:t>
+              <a:t>15/07/2020</a:t>
             </a:fld>
             <a:endParaRPr lang="pt-BR"/>
           </a:p>
@@ -1272,7 +1273,7 @@
           <a:p>
             <a:fld id="{0DAC32FC-DBAC-4007-937A-15B4E69A3744}" type="datetimeFigureOut">
               <a:rPr lang="pt-BR" smtClean="0"/>
-              <a:t>04/06/2020</a:t>
+              <a:t>15/07/2020</a:t>
             </a:fld>
             <a:endParaRPr lang="pt-BR"/>
           </a:p>
@@ -1639,7 +1640,7 @@
           <a:p>
             <a:fld id="{0DAC32FC-DBAC-4007-937A-15B4E69A3744}" type="datetimeFigureOut">
               <a:rPr lang="pt-BR" smtClean="0"/>
-              <a:t>04/06/2020</a:t>
+              <a:t>15/07/2020</a:t>
             </a:fld>
             <a:endParaRPr lang="pt-BR"/>
           </a:p>
@@ -1757,7 +1758,7 @@
           <a:p>
             <a:fld id="{0DAC32FC-DBAC-4007-937A-15B4E69A3744}" type="datetimeFigureOut">
               <a:rPr lang="pt-BR" smtClean="0"/>
-              <a:t>04/06/2020</a:t>
+              <a:t>15/07/2020</a:t>
             </a:fld>
             <a:endParaRPr lang="pt-BR"/>
           </a:p>
@@ -1852,7 +1853,7 @@
           <a:p>
             <a:fld id="{0DAC32FC-DBAC-4007-937A-15B4E69A3744}" type="datetimeFigureOut">
               <a:rPr lang="pt-BR" smtClean="0"/>
-              <a:t>04/06/2020</a:t>
+              <a:t>15/07/2020</a:t>
             </a:fld>
             <a:endParaRPr lang="pt-BR"/>
           </a:p>
@@ -2129,7 +2130,7 @@
           <a:p>
             <a:fld id="{0DAC32FC-DBAC-4007-937A-15B4E69A3744}" type="datetimeFigureOut">
               <a:rPr lang="pt-BR" smtClean="0"/>
-              <a:t>04/06/2020</a:t>
+              <a:t>15/07/2020</a:t>
             </a:fld>
             <a:endParaRPr lang="pt-BR"/>
           </a:p>
@@ -2382,7 +2383,7 @@
           <a:p>
             <a:fld id="{0DAC32FC-DBAC-4007-937A-15B4E69A3744}" type="datetimeFigureOut">
               <a:rPr lang="pt-BR" smtClean="0"/>
-              <a:t>04/06/2020</a:t>
+              <a:t>15/07/2020</a:t>
             </a:fld>
             <a:endParaRPr lang="pt-BR"/>
           </a:p>
@@ -2595,7 +2596,7 @@
           <a:p>
             <a:fld id="{0DAC32FC-DBAC-4007-937A-15B4E69A3744}" type="datetimeFigureOut">
               <a:rPr lang="pt-BR" smtClean="0"/>
-              <a:t>04/06/2020</a:t>
+              <a:t>15/07/2020</a:t>
             </a:fld>
             <a:endParaRPr lang="pt-BR"/>
           </a:p>
@@ -3002,483 +3003,6 @@
       </p:grpSpPr>
       <p:grpSp>
         <p:nvGrpSpPr>
-          <p:cNvPr id="15" name="Agrupar 14"/>
-          <p:cNvGrpSpPr/>
-          <p:nvPr/>
-        </p:nvGrpSpPr>
-        <p:grpSpPr>
-          <a:xfrm>
-            <a:off x="770709" y="179912"/>
-            <a:ext cx="10116457" cy="6207826"/>
-            <a:chOff x="770709" y="179912"/>
-            <a:chExt cx="10116457" cy="6207826"/>
-          </a:xfrm>
-        </p:grpSpPr>
-        <p:pic>
-          <p:nvPicPr>
-            <p:cNvPr id="4" name="Imagem 3"/>
-            <p:cNvPicPr>
-              <a:picLocks noChangeAspect="1"/>
-            </p:cNvPicPr>
-            <p:nvPr/>
-          </p:nvPicPr>
-          <p:blipFill>
-            <a:blip r:embed="rId2"/>
-            <a:stretch>
-              <a:fillRect/>
-            </a:stretch>
-          </p:blipFill>
-          <p:spPr>
-            <a:xfrm>
-              <a:off x="770709" y="179912"/>
-              <a:ext cx="10116457" cy="6207826"/>
-            </a:xfrm>
-            <a:prstGeom prst="rect">
-              <a:avLst/>
-            </a:prstGeom>
-          </p:spPr>
-        </p:pic>
-        <p:grpSp>
-          <p:nvGrpSpPr>
-            <p:cNvPr id="14" name="Agrupar 13"/>
-            <p:cNvGrpSpPr/>
-            <p:nvPr/>
-          </p:nvGrpSpPr>
-          <p:grpSpPr>
-            <a:xfrm>
-              <a:off x="1593669" y="1449977"/>
-              <a:ext cx="8873380" cy="4937761"/>
-              <a:chOff x="1593669" y="1449977"/>
-              <a:chExt cx="8873380" cy="4937761"/>
-            </a:xfrm>
-          </p:grpSpPr>
-          <p:pic>
-            <p:nvPicPr>
-              <p:cNvPr id="5" name="Imagem 4"/>
-              <p:cNvPicPr>
-                <a:picLocks noChangeAspect="1"/>
-              </p:cNvPicPr>
-              <p:nvPr/>
-            </p:nvPicPr>
-            <p:blipFill>
-              <a:blip r:embed="rId3"/>
-              <a:stretch>
-                <a:fillRect/>
-              </a:stretch>
-            </p:blipFill>
-            <p:spPr>
-              <a:xfrm>
-                <a:off x="9053919" y="5385161"/>
-                <a:ext cx="1235803" cy="780507"/>
-              </a:xfrm>
-              <a:prstGeom prst="rect">
-                <a:avLst/>
-              </a:prstGeom>
-            </p:spPr>
-          </p:pic>
-          <p:pic>
-            <p:nvPicPr>
-              <p:cNvPr id="9" name="Imagem 8"/>
-              <p:cNvPicPr>
-                <a:picLocks noChangeAspect="1"/>
-              </p:cNvPicPr>
-              <p:nvPr/>
-            </p:nvPicPr>
-            <p:blipFill>
-              <a:blip r:embed="rId4"/>
-              <a:stretch>
-                <a:fillRect/>
-              </a:stretch>
-            </p:blipFill>
-            <p:spPr>
-              <a:xfrm>
-                <a:off x="6263396" y="5339720"/>
-                <a:ext cx="1956300" cy="1048018"/>
-              </a:xfrm>
-              <a:prstGeom prst="rect">
-                <a:avLst/>
-              </a:prstGeom>
-            </p:spPr>
-          </p:pic>
-          <p:pic>
-            <p:nvPicPr>
-              <p:cNvPr id="10" name="Imagem 9"/>
-              <p:cNvPicPr>
-                <a:picLocks noChangeAspect="1"/>
-              </p:cNvPicPr>
-              <p:nvPr/>
-            </p:nvPicPr>
-            <p:blipFill>
-              <a:blip r:embed="rId5"/>
-              <a:stretch>
-                <a:fillRect/>
-              </a:stretch>
-            </p:blipFill>
-            <p:spPr>
-              <a:xfrm>
-                <a:off x="3970699" y="2840912"/>
-                <a:ext cx="1956578" cy="1130197"/>
-              </a:xfrm>
-              <a:prstGeom prst="rect">
-                <a:avLst/>
-              </a:prstGeom>
-            </p:spPr>
-          </p:pic>
-          <p:pic>
-            <p:nvPicPr>
-              <p:cNvPr id="11" name="Imagem 10"/>
-              <p:cNvPicPr>
-                <a:picLocks noChangeAspect="1"/>
-              </p:cNvPicPr>
-              <p:nvPr/>
-            </p:nvPicPr>
-            <p:blipFill>
-              <a:blip r:embed="rId6"/>
-              <a:stretch>
-                <a:fillRect/>
-              </a:stretch>
-            </p:blipFill>
-            <p:spPr>
-              <a:xfrm>
-                <a:off x="4178889" y="1627550"/>
-                <a:ext cx="1461105" cy="1037273"/>
-              </a:xfrm>
-              <a:prstGeom prst="rect">
-                <a:avLst/>
-              </a:prstGeom>
-            </p:spPr>
-          </p:pic>
-          <p:pic>
-            <p:nvPicPr>
-              <p:cNvPr id="1028" name="Picture 4" descr="Coronavírus (COVID-19): informe-se aqui! - Brasil Escola"/>
-              <p:cNvPicPr>
-                <a:picLocks noChangeAspect="1" noChangeArrowheads="1"/>
-              </p:cNvPicPr>
-              <p:nvPr/>
-            </p:nvPicPr>
-            <p:blipFill rotWithShape="1">
-              <a:blip r:embed="rId7" cstate="print">
-                <a:extLst>
-                  <a:ext uri="{28A0092B-C50C-407E-A947-70E740481C1C}">
-                    <a14:useLocalDpi xmlns:a14="http://schemas.microsoft.com/office/drawing/2010/main" val="0"/>
-                  </a:ext>
-                </a:extLst>
-              </a:blip>
-              <a:srcRect r="33236"/>
-              <a:stretch/>
-            </p:blipFill>
-            <p:spPr bwMode="auto">
-              <a:xfrm>
-                <a:off x="2076994" y="1627550"/>
-                <a:ext cx="796835" cy="745949"/>
-              </a:xfrm>
-              <a:prstGeom prst="rect">
-                <a:avLst/>
-              </a:prstGeom>
-              <a:noFill/>
-              <a:extLst>
-                <a:ext uri="{909E8E84-426E-40DD-AFC4-6F175D3DCCD1}">
-                  <a14:hiddenFill xmlns:a14="http://schemas.microsoft.com/office/drawing/2010/main">
-                    <a:solidFill>
-                      <a:srgbClr val="FFFFFF"/>
-                    </a:solidFill>
-                  </a14:hiddenFill>
-                </a:ext>
-              </a:extLst>
-            </p:spPr>
-          </p:pic>
-          <p:sp>
-            <p:nvSpPr>
-              <p:cNvPr id="12" name="CaixaDeTexto 11"/>
-              <p:cNvSpPr txBox="1"/>
-              <p:nvPr/>
-            </p:nvSpPr>
-            <p:spPr>
-              <a:xfrm>
-                <a:off x="2076994" y="2373499"/>
-                <a:ext cx="796835" cy="261610"/>
-              </a:xfrm>
-              <a:prstGeom prst="rect">
-                <a:avLst/>
-              </a:prstGeom>
-              <a:noFill/>
-            </p:spPr>
-            <p:txBody>
-              <a:bodyPr wrap="square" rtlCol="0">
-                <a:spAutoFit/>
-              </a:bodyPr>
-              <a:lstStyle/>
-              <a:p>
-                <a:r>
-                  <a:rPr lang="pt-BR" sz="1100" b="1" dirty="0" smtClean="0">
-                    <a:solidFill>
-                      <a:schemeClr val="bg1"/>
-                    </a:solidFill>
-                  </a:rPr>
-                  <a:t>COVID -19</a:t>
-                </a:r>
-                <a:endParaRPr lang="pt-BR" sz="1100" b="1" dirty="0">
-                  <a:solidFill>
-                    <a:schemeClr val="bg1"/>
-                  </a:solidFill>
-                </a:endParaRPr>
-              </a:p>
-            </p:txBody>
-          </p:sp>
-          <p:sp>
-            <p:nvSpPr>
-              <p:cNvPr id="13" name="Retângulo 12"/>
-              <p:cNvSpPr/>
-              <p:nvPr/>
-            </p:nvSpPr>
-            <p:spPr>
-              <a:xfrm>
-                <a:off x="1593669" y="1449977"/>
-                <a:ext cx="1698171" cy="1214846"/>
-              </a:xfrm>
-              <a:prstGeom prst="rect">
-                <a:avLst/>
-              </a:prstGeom>
-              <a:noFill/>
-              <a:ln w="76200">
-                <a:solidFill>
-                  <a:srgbClr val="FFFF00"/>
-                </a:solidFill>
-              </a:ln>
-            </p:spPr>
-            <p:style>
-              <a:lnRef idx="2">
-                <a:schemeClr val="accent4"/>
-              </a:lnRef>
-              <a:fillRef idx="1">
-                <a:schemeClr val="lt1"/>
-              </a:fillRef>
-              <a:effectRef idx="0">
-                <a:schemeClr val="accent4"/>
-              </a:effectRef>
-              <a:fontRef idx="minor">
-                <a:schemeClr val="dk1"/>
-              </a:fontRef>
-            </p:style>
-            <p:txBody>
-              <a:bodyPr rtlCol="0" anchor="ctr"/>
-              <a:lstStyle/>
-              <a:p>
-                <a:pPr algn="ctr"/>
-                <a:endParaRPr lang="pt-BR"/>
-              </a:p>
-            </p:txBody>
-          </p:sp>
-          <p:sp>
-            <p:nvSpPr>
-              <p:cNvPr id="16" name="Retângulo 15"/>
-              <p:cNvSpPr/>
-              <p:nvPr/>
-            </p:nvSpPr>
-            <p:spPr>
-              <a:xfrm>
-                <a:off x="4114800" y="1508500"/>
-                <a:ext cx="1698171" cy="1214846"/>
-              </a:xfrm>
-              <a:prstGeom prst="rect">
-                <a:avLst/>
-              </a:prstGeom>
-              <a:noFill/>
-              <a:ln w="76200">
-                <a:solidFill>
-                  <a:srgbClr val="FFFF00"/>
-                </a:solidFill>
-              </a:ln>
-            </p:spPr>
-            <p:style>
-              <a:lnRef idx="2">
-                <a:schemeClr val="accent4"/>
-              </a:lnRef>
-              <a:fillRef idx="1">
-                <a:schemeClr val="lt1"/>
-              </a:fillRef>
-              <a:effectRef idx="0">
-                <a:schemeClr val="accent4"/>
-              </a:effectRef>
-              <a:fontRef idx="minor">
-                <a:schemeClr val="dk1"/>
-              </a:fontRef>
-            </p:style>
-            <p:txBody>
-              <a:bodyPr rtlCol="0" anchor="ctr"/>
-              <a:lstStyle/>
-              <a:p>
-                <a:pPr algn="ctr"/>
-                <a:endParaRPr lang="pt-BR"/>
-              </a:p>
-            </p:txBody>
-          </p:sp>
-          <p:sp>
-            <p:nvSpPr>
-              <p:cNvPr id="17" name="Retângulo 16"/>
-              <p:cNvSpPr/>
-              <p:nvPr/>
-            </p:nvSpPr>
-            <p:spPr>
-              <a:xfrm>
-                <a:off x="4130766" y="2873829"/>
-                <a:ext cx="1698171" cy="1214846"/>
-              </a:xfrm>
-              <a:prstGeom prst="rect">
-                <a:avLst/>
-              </a:prstGeom>
-              <a:noFill/>
-              <a:ln w="76200">
-                <a:solidFill>
-                  <a:srgbClr val="FFFF00"/>
-                </a:solidFill>
-              </a:ln>
-            </p:spPr>
-            <p:style>
-              <a:lnRef idx="2">
-                <a:schemeClr val="accent4"/>
-              </a:lnRef>
-              <a:fillRef idx="1">
-                <a:schemeClr val="lt1"/>
-              </a:fillRef>
-              <a:effectRef idx="0">
-                <a:schemeClr val="accent4"/>
-              </a:effectRef>
-              <a:fontRef idx="minor">
-                <a:schemeClr val="dk1"/>
-              </a:fontRef>
-            </p:style>
-            <p:txBody>
-              <a:bodyPr rtlCol="0" anchor="ctr"/>
-              <a:lstStyle/>
-              <a:p>
-                <a:pPr algn="ctr"/>
-                <a:endParaRPr lang="pt-BR"/>
-              </a:p>
-            </p:txBody>
-          </p:sp>
-          <p:sp>
-            <p:nvSpPr>
-              <p:cNvPr id="20" name="Retângulo 19"/>
-              <p:cNvSpPr/>
-              <p:nvPr/>
-            </p:nvSpPr>
-            <p:spPr>
-              <a:xfrm>
-                <a:off x="6392460" y="5167991"/>
-                <a:ext cx="1698171" cy="1214846"/>
-              </a:xfrm>
-              <a:prstGeom prst="rect">
-                <a:avLst/>
-              </a:prstGeom>
-              <a:noFill/>
-              <a:ln w="76200">
-                <a:solidFill>
-                  <a:srgbClr val="FFFF00"/>
-                </a:solidFill>
-              </a:ln>
-            </p:spPr>
-            <p:style>
-              <a:lnRef idx="2">
-                <a:schemeClr val="accent4"/>
-              </a:lnRef>
-              <a:fillRef idx="1">
-                <a:schemeClr val="lt1"/>
-              </a:fillRef>
-              <a:effectRef idx="0">
-                <a:schemeClr val="accent4"/>
-              </a:effectRef>
-              <a:fontRef idx="minor">
-                <a:schemeClr val="dk1"/>
-              </a:fontRef>
-            </p:style>
-            <p:txBody>
-              <a:bodyPr rtlCol="0" anchor="ctr"/>
-              <a:lstStyle/>
-              <a:p>
-                <a:pPr algn="ctr"/>
-                <a:endParaRPr lang="pt-BR"/>
-              </a:p>
-            </p:txBody>
-          </p:sp>
-          <p:sp>
-            <p:nvSpPr>
-              <p:cNvPr id="21" name="Retângulo 20"/>
-              <p:cNvSpPr/>
-              <p:nvPr/>
-            </p:nvSpPr>
-            <p:spPr>
-              <a:xfrm>
-                <a:off x="8768878" y="5167991"/>
-                <a:ext cx="1698171" cy="1214846"/>
-              </a:xfrm>
-              <a:prstGeom prst="rect">
-                <a:avLst/>
-              </a:prstGeom>
-              <a:noFill/>
-              <a:ln w="76200">
-                <a:solidFill>
-                  <a:srgbClr val="FFFF00"/>
-                </a:solidFill>
-              </a:ln>
-            </p:spPr>
-            <p:style>
-              <a:lnRef idx="2">
-                <a:schemeClr val="accent4"/>
-              </a:lnRef>
-              <a:fillRef idx="1">
-                <a:schemeClr val="lt1"/>
-              </a:fillRef>
-              <a:effectRef idx="0">
-                <a:schemeClr val="accent4"/>
-              </a:effectRef>
-              <a:fontRef idx="minor">
-                <a:schemeClr val="dk1"/>
-              </a:fontRef>
-            </p:style>
-            <p:txBody>
-              <a:bodyPr rtlCol="0" anchor="ctr"/>
-              <a:lstStyle/>
-              <a:p>
-                <a:pPr algn="ctr"/>
-                <a:endParaRPr lang="pt-BR"/>
-              </a:p>
-            </p:txBody>
-          </p:sp>
-        </p:grpSp>
-      </p:grpSp>
-    </p:spTree>
-    <p:extLst>
-      <p:ext uri="{BB962C8B-B14F-4D97-AF65-F5344CB8AC3E}">
-        <p14:creationId xmlns:p14="http://schemas.microsoft.com/office/powerpoint/2010/main" val="1227896254"/>
-      </p:ext>
-    </p:extLst>
-  </p:cSld>
-  <p:clrMapOvr>
-    <a:masterClrMapping/>
-  </p:clrMapOvr>
-</p:sld>
-</file>
-
-<file path=ppt/slides/slide2.xml><?xml version="1.0" encoding="utf-8"?>
-<p:sld xmlns:a="http://schemas.openxmlformats.org/drawingml/2006/main" xmlns:r="http://schemas.openxmlformats.org/officeDocument/2006/relationships" xmlns:p="http://schemas.openxmlformats.org/presentationml/2006/main">
-  <p:cSld>
-    <p:spTree>
-      <p:nvGrpSpPr>
-        <p:cNvPr id="1" name=""/>
-        <p:cNvGrpSpPr/>
-        <p:nvPr/>
-      </p:nvGrpSpPr>
-      <p:grpSpPr>
-        <a:xfrm>
-          <a:off x="0" y="0"/>
-          <a:ext cx="0" cy="0"/>
-          <a:chOff x="0" y="0"/>
-          <a:chExt cx="0" cy="0"/>
-        </a:xfrm>
-      </p:grpSpPr>
-      <p:grpSp>
-        <p:nvGrpSpPr>
           <p:cNvPr id="2" name="Agrupar 1"/>
           <p:cNvGrpSpPr/>
           <p:nvPr/>
@@ -3782,7 +3306,7 @@
 </p:sld>
 </file>
 
-<file path=ppt/slides/slide3.xml><?xml version="1.0" encoding="utf-8"?>
+<file path=ppt/slides/slide2.xml><?xml version="1.0" encoding="utf-8"?>
 <p:sld xmlns:a="http://schemas.openxmlformats.org/drawingml/2006/main" xmlns:r="http://schemas.openxmlformats.org/officeDocument/2006/relationships" xmlns:p="http://schemas.openxmlformats.org/presentationml/2006/main">
   <p:cSld>
     <p:spTree>
@@ -4285,7 +3809,7 @@
 </p:sld>
 </file>
 
-<file path=ppt/slides/slide4.xml><?xml version="1.0" encoding="utf-8"?>
+<file path=ppt/slides/slide3.xml><?xml version="1.0" encoding="utf-8"?>
 <p:sld xmlns:a="http://schemas.openxmlformats.org/drawingml/2006/main" xmlns:r="http://schemas.openxmlformats.org/officeDocument/2006/relationships" xmlns:p="http://schemas.openxmlformats.org/presentationml/2006/main">
   <p:cSld>
     <p:spTree>
@@ -4589,7 +4113,7 @@
 </p:sld>
 </file>
 
-<file path=ppt/slides/slide5.xml><?xml version="1.0" encoding="utf-8"?>
+<file path=ppt/slides/slide4.xml><?xml version="1.0" encoding="utf-8"?>
 <p:sld xmlns:a="http://schemas.openxmlformats.org/drawingml/2006/main" xmlns:r="http://schemas.openxmlformats.org/officeDocument/2006/relationships" xmlns:p="http://schemas.openxmlformats.org/presentationml/2006/main">
   <p:cSld>
     <p:spTree>
@@ -4818,6 +4342,145 @@
 </p:sld>
 </file>
 
+<file path=ppt/slides/slide5.xml><?xml version="1.0" encoding="utf-8"?>
+<p:sld xmlns:a="http://schemas.openxmlformats.org/drawingml/2006/main" xmlns:r="http://schemas.openxmlformats.org/officeDocument/2006/relationships" xmlns:p="http://schemas.openxmlformats.org/presentationml/2006/main">
+  <p:cSld>
+    <p:spTree>
+      <p:nvGrpSpPr>
+        <p:cNvPr id="1" name=""/>
+        <p:cNvGrpSpPr/>
+        <p:nvPr/>
+      </p:nvGrpSpPr>
+      <p:grpSpPr>
+        <a:xfrm>
+          <a:off x="0" y="0"/>
+          <a:ext cx="0" cy="0"/>
+          <a:chOff x="0" y="0"/>
+          <a:chExt cx="0" cy="0"/>
+        </a:xfrm>
+      </p:grpSpPr>
+      <p:grpSp>
+        <p:nvGrpSpPr>
+          <p:cNvPr id="8" name="Agrupar 7"/>
+          <p:cNvGrpSpPr/>
+          <p:nvPr/>
+        </p:nvGrpSpPr>
+        <p:grpSpPr>
+          <a:xfrm>
+            <a:off x="483325" y="530350"/>
+            <a:ext cx="11240519" cy="5805136"/>
+            <a:chOff x="483325" y="530350"/>
+            <a:chExt cx="11240519" cy="5805136"/>
+          </a:xfrm>
+        </p:grpSpPr>
+        <p:pic>
+          <p:nvPicPr>
+            <p:cNvPr id="5" name="Imagem 4"/>
+            <p:cNvPicPr>
+              <a:picLocks noChangeAspect="1"/>
+            </p:cNvPicPr>
+            <p:nvPr/>
+          </p:nvPicPr>
+          <p:blipFill>
+            <a:blip r:embed="rId2"/>
+            <a:stretch>
+              <a:fillRect/>
+            </a:stretch>
+          </p:blipFill>
+          <p:spPr>
+            <a:xfrm>
+              <a:off x="483325" y="530350"/>
+              <a:ext cx="11240519" cy="5805136"/>
+            </a:xfrm>
+            <a:prstGeom prst="rect">
+              <a:avLst/>
+            </a:prstGeom>
+          </p:spPr>
+        </p:pic>
+        <p:pic>
+          <p:nvPicPr>
+            <p:cNvPr id="6" name="Imagem 5"/>
+            <p:cNvPicPr>
+              <a:picLocks noChangeAspect="1"/>
+            </p:cNvPicPr>
+            <p:nvPr/>
+          </p:nvPicPr>
+          <p:blipFill>
+            <a:blip r:embed="rId3"/>
+            <a:stretch>
+              <a:fillRect/>
+            </a:stretch>
+          </p:blipFill>
+          <p:spPr>
+            <a:xfrm>
+              <a:off x="9374777" y="4583702"/>
+              <a:ext cx="914400" cy="590550"/>
+            </a:xfrm>
+            <a:prstGeom prst="rect">
+              <a:avLst/>
+            </a:prstGeom>
+          </p:spPr>
+        </p:pic>
+        <p:sp>
+          <p:nvSpPr>
+            <p:cNvPr id="7" name="Retângulo 6"/>
+            <p:cNvSpPr/>
+            <p:nvPr/>
+          </p:nvSpPr>
+          <p:spPr>
+            <a:xfrm>
+              <a:off x="8721319" y="5371274"/>
+              <a:ext cx="2221317" cy="338554"/>
+            </a:xfrm>
+            <a:prstGeom prst="rect">
+              <a:avLst/>
+            </a:prstGeom>
+          </p:spPr>
+          <p:txBody>
+            <a:bodyPr wrap="square">
+              <a:spAutoFit/>
+            </a:bodyPr>
+            <a:lstStyle/>
+            <a:p>
+              <a:pPr algn="ctr"/>
+              <a:r>
+                <a:rPr lang="pt-BR" sz="1600" dirty="0" smtClean="0">
+                  <a:solidFill>
+                    <a:schemeClr val="bg1"/>
+                  </a:solidFill>
+                </a:rPr>
+                <a:t>Doaç</a:t>
+              </a:r>
+              <a:r>
+                <a:rPr lang="pt-BR" sz="1600" dirty="0" smtClean="0">
+                  <a:solidFill>
+                    <a:schemeClr val="bg1"/>
+                  </a:solidFill>
+                </a:rPr>
+                <a:t>ões</a:t>
+              </a:r>
+              <a:endParaRPr lang="pt-BR" sz="1400" dirty="0">
+                <a:solidFill>
+                  <a:schemeClr val="bg1"/>
+                </a:solidFill>
+              </a:endParaRPr>
+            </a:p>
+          </p:txBody>
+        </p:sp>
+      </p:grpSp>
+    </p:spTree>
+    <p:extLst>
+      <p:ext uri="{BB962C8B-B14F-4D97-AF65-F5344CB8AC3E}">
+        <p14:creationId xmlns:p14="http://schemas.microsoft.com/office/powerpoint/2010/main" val="801519553"/>
+      </p:ext>
+    </p:extLst>
+  </p:cSld>
+  <p:clrMapOvr>
+    <a:masterClrMapping/>
+  </p:clrMapOvr>
+</p:sld>
+</file>
+
 <file path=ppt/slides/slide6.xml><?xml version="1.0" encoding="utf-8"?>
 <p:sld xmlns:a="http://schemas.openxmlformats.org/drawingml/2006/main" xmlns:r="http://schemas.openxmlformats.org/officeDocument/2006/relationships" xmlns:p="http://schemas.openxmlformats.org/presentationml/2006/main">
   <p:cSld>
@@ -4835,51 +4498,528 @@
           <a:chExt cx="0" cy="0"/>
         </a:xfrm>
       </p:grpSpPr>
-      <p:sp>
-        <p:nvSpPr>
-          <p:cNvPr id="2" name="Título 1"/>
-          <p:cNvSpPr>
-            <a:spLocks noGrp="1"/>
-          </p:cNvSpPr>
-          <p:nvPr>
-            <p:ph type="title"/>
-          </p:nvPr>
-        </p:nvSpPr>
-        <p:spPr/>
-        <p:txBody>
-          <a:bodyPr/>
+      <p:grpSp>
+        <p:nvGrpSpPr>
+          <p:cNvPr id="7" name="Agrupar 6"/>
+          <p:cNvGrpSpPr/>
+          <p:nvPr/>
+        </p:nvGrpSpPr>
+        <p:grpSpPr>
+          <a:xfrm>
+            <a:off x="1367148" y="136206"/>
+            <a:ext cx="9544379" cy="3247074"/>
+            <a:chOff x="1367148" y="136206"/>
+            <a:chExt cx="9544379" cy="3247074"/>
+          </a:xfrm>
+        </p:grpSpPr>
+        <p:pic>
+          <p:nvPicPr>
+            <p:cNvPr id="4" name="Imagem 3"/>
+            <p:cNvPicPr>
+              <a:picLocks noChangeAspect="1"/>
+            </p:cNvPicPr>
+            <p:nvPr/>
+          </p:nvPicPr>
+          <p:blipFill>
+            <a:blip r:embed="rId2"/>
+            <a:stretch>
+              <a:fillRect/>
+            </a:stretch>
+          </p:blipFill>
+          <p:spPr>
+            <a:xfrm>
+              <a:off x="1632448" y="136206"/>
+              <a:ext cx="8883152" cy="2397481"/>
+            </a:xfrm>
+            <a:prstGeom prst="rect">
+              <a:avLst/>
+            </a:prstGeom>
+          </p:spPr>
+        </p:pic>
+        <p:pic>
+          <p:nvPicPr>
+            <p:cNvPr id="5" name="Imagem 4"/>
+            <p:cNvPicPr>
+              <a:picLocks noChangeAspect="1"/>
+            </p:cNvPicPr>
+            <p:nvPr/>
+          </p:nvPicPr>
+          <p:blipFill>
+            <a:blip r:embed="rId3"/>
+            <a:stretch>
+              <a:fillRect/>
+            </a:stretch>
+          </p:blipFill>
+          <p:spPr>
+            <a:xfrm>
+              <a:off x="1367148" y="2653665"/>
+              <a:ext cx="9544379" cy="729615"/>
+            </a:xfrm>
+            <a:prstGeom prst="rect">
+              <a:avLst/>
+            </a:prstGeom>
+          </p:spPr>
+        </p:pic>
+      </p:grpSp>
+      <p:sp>
+        <p:nvSpPr>
+          <p:cNvPr id="6" name="CaixaDeTexto 5"/>
+          <p:cNvSpPr txBox="1"/>
+          <p:nvPr/>
+        </p:nvSpPr>
+        <p:spPr>
+          <a:xfrm>
+            <a:off x="1632448" y="3383280"/>
+            <a:ext cx="9614672" cy="3831818"/>
+          </a:xfrm>
+          <a:prstGeom prst="rect">
+            <a:avLst/>
+          </a:prstGeom>
+          <a:noFill/>
+        </p:spPr>
+        <p:txBody>
+          <a:bodyPr wrap="square" rtlCol="0">
+            <a:spAutoFit/>
+          </a:bodyPr>
           <a:lstStyle/>
           <a:p>
             <a:r>
-              <a:rPr lang="pt-BR" dirty="0"/>
-              <a:t>Dados epidemiológicos</a:t>
-            </a:r>
-          </a:p>
-        </p:txBody>
-      </p:sp>
-      <p:sp>
-        <p:nvSpPr>
-          <p:cNvPr id="3" name="Espaço Reservado para Conteúdo 2"/>
-          <p:cNvSpPr>
-            <a:spLocks noGrp="1"/>
-          </p:cNvSpPr>
-          <p:nvPr>
-            <p:ph idx="1"/>
-          </p:nvPr>
-        </p:nvSpPr>
-        <p:spPr/>
-        <p:txBody>
-          <a:bodyPr/>
-          <a:lstStyle/>
-          <a:p>
-            <a:endParaRPr lang="pt-BR"/>
+              <a:rPr lang="pt-BR" sz="1500" dirty="0"/>
+              <a:t>Com foco no fomento da transparência e melhores práticas para atender ao cidadão, o Estado de Minas Gerais disponibiliza seção específica para divulgar dados referentes à COVID-19 no estado de Minas</a:t>
+            </a:r>
+            <a:r>
+              <a:rPr lang="pt-BR" sz="1500" dirty="0" smtClean="0"/>
+              <a:t>.</a:t>
+            </a:r>
+          </a:p>
+          <a:p>
+            <a:endParaRPr lang="pt-BR" sz="1500" dirty="0"/>
+          </a:p>
+          <a:p>
+            <a:r>
+              <a:rPr lang="pt-BR" sz="1500" dirty="0"/>
+              <a:t>As informações disponíveis na nova seção são relativas a</a:t>
+            </a:r>
+            <a:r>
+              <a:rPr lang="pt-BR" sz="1500" dirty="0" smtClean="0"/>
+              <a:t>:</a:t>
+            </a:r>
+          </a:p>
+          <a:p>
+            <a:r>
+              <a:rPr lang="pt-BR" sz="1500" dirty="0" smtClean="0"/>
+              <a:t>•</a:t>
+            </a:r>
+            <a:r>
+              <a:rPr lang="pt-BR" sz="1500" dirty="0"/>
+              <a:t> </a:t>
+            </a:r>
+            <a:r>
+              <a:rPr lang="pt-BR" sz="1500" dirty="0">
+                <a:hlinkClick r:id="rId4"/>
+              </a:rPr>
+              <a:t>Legislação e Normativos</a:t>
+            </a:r>
+            <a:r>
+              <a:rPr lang="pt-BR" sz="1500" dirty="0"/>
+              <a:t> relacionados às medidas de proteção e combate à COVID-19;</a:t>
+            </a:r>
+            <a:br>
+              <a:rPr lang="pt-BR" sz="1500" dirty="0"/>
+            </a:br>
+            <a:r>
+              <a:rPr lang="pt-BR" sz="1500" dirty="0"/>
+              <a:t>•</a:t>
+            </a:r>
+            <a:r>
+              <a:rPr lang="pt-BR" sz="1500" dirty="0">
+                <a:hlinkClick r:id="rId5"/>
+              </a:rPr>
+              <a:t> Dados abertos</a:t>
+            </a:r>
+            <a:r>
+              <a:rPr lang="pt-BR" sz="1500" dirty="0"/>
+              <a:t>: todos os conjuntos de dados relacionados a COVID-19 ;</a:t>
+            </a:r>
+            <a:br>
+              <a:rPr lang="pt-BR" sz="1500" dirty="0"/>
+            </a:br>
+            <a:r>
+              <a:rPr lang="pt-BR" sz="1500" dirty="0"/>
+              <a:t>•</a:t>
+            </a:r>
+            <a:r>
+              <a:rPr lang="pt-BR" sz="1500" dirty="0">
+                <a:hlinkClick r:id="rId6"/>
+              </a:rPr>
+              <a:t> Conselho de Transparência e Combate à Corrupção</a:t>
+            </a:r>
+            <a:r>
+              <a:rPr lang="pt-BR" sz="1500" dirty="0"/>
+              <a:t>: informações sobre o Conselho de Transparência e Combate à Corrupção e sua atuação no monitoramento e avaliação das ações relacionadas ao enfrentamento da COVID-19; e</a:t>
+            </a:r>
+            <a:br>
+              <a:rPr lang="pt-BR" sz="1500" dirty="0"/>
+            </a:br>
+            <a:r>
+              <a:rPr lang="pt-BR" sz="1500" dirty="0"/>
+              <a:t>• </a:t>
+            </a:r>
+            <a:r>
+              <a:rPr lang="pt-BR" sz="1500" dirty="0">
+                <a:hlinkClick r:id="rId7"/>
+              </a:rPr>
+              <a:t>Dados Epidemiológicos:</a:t>
+            </a:r>
+            <a:r>
+              <a:rPr lang="pt-BR" sz="1500" dirty="0"/>
+              <a:t> informações relativas ao boletim epidemiológicos, painel de monitoramento de casos, orientações para o cidadão e outros dados relacionados ao </a:t>
+            </a:r>
+            <a:r>
+              <a:rPr lang="pt-BR" sz="1500" dirty="0" err="1"/>
+              <a:t>coronavírus</a:t>
+            </a:r>
+            <a:r>
+              <a:rPr lang="pt-BR" sz="1500" dirty="0"/>
+              <a:t> divulgadas pela Secretaria de Estado da Saúde.</a:t>
+            </a:r>
+          </a:p>
+          <a:p>
+            <a:r>
+              <a:rPr lang="pt-BR" sz="1500" dirty="0"/>
+              <a:t>É possível, ainda, solicitar informações relativas à pandemia por meio do</a:t>
+            </a:r>
+            <a:r>
+              <a:rPr lang="pt-BR" sz="1500" dirty="0">
+                <a:hlinkClick r:id="rId8"/>
+              </a:rPr>
+              <a:t> Acesso à Informação </a:t>
+            </a:r>
+            <a:r>
+              <a:rPr lang="pt-BR" sz="1500" dirty="0"/>
+              <a:t>e realizar denúncias, reclamações e sugestões por meio do canal exclusivo da </a:t>
+            </a:r>
+            <a:r>
+              <a:rPr lang="pt-BR" sz="1500" dirty="0">
+                <a:hlinkClick r:id="rId9"/>
+              </a:rPr>
+              <a:t>Ouvidoria</a:t>
+            </a:r>
+            <a:r>
+              <a:rPr lang="pt-BR" sz="1500" dirty="0"/>
+              <a:t>.</a:t>
+            </a:r>
+          </a:p>
+          <a:p>
+            <a:r>
+              <a:rPr lang="pt-BR" sz="1500" dirty="0"/>
+              <a:t>As informações sobre as contratações e aquisições para enfrentar a emergência de saúde pública decorrente da pandemia da COVID-19 estão dispostas no Portal de Transparência de três formas, para conhecê-las </a:t>
+            </a:r>
+            <a:r>
+              <a:rPr lang="pt-BR" sz="1500" dirty="0">
+                <a:hlinkClick r:id="rId10"/>
+              </a:rPr>
+              <a:t>clique aqui</a:t>
+            </a:r>
+            <a:r>
+              <a:rPr lang="pt-BR" sz="1500" dirty="0"/>
+              <a:t>.</a:t>
+            </a:r>
+          </a:p>
+          <a:p>
+            <a:endParaRPr lang="pt-BR" sz="1500" dirty="0"/>
+          </a:p>
+          <a:p>
+            <a:endParaRPr lang="pt-BR" dirty="0"/>
           </a:p>
         </p:txBody>
       </p:sp>
     </p:spTree>
     <p:extLst>
       <p:ext uri="{BB962C8B-B14F-4D97-AF65-F5344CB8AC3E}">
-        <p14:creationId xmlns:p14="http://schemas.microsoft.com/office/powerpoint/2010/main" val="801519553"/>
+        <p14:creationId xmlns:p14="http://schemas.microsoft.com/office/powerpoint/2010/main" val="3270441518"/>
+      </p:ext>
+    </p:extLst>
+  </p:cSld>
+  <p:clrMapOvr>
+    <a:masterClrMapping/>
+  </p:clrMapOvr>
+</p:sld>
+</file>
+
+<file path=ppt/slides/slide7.xml><?xml version="1.0" encoding="utf-8"?>
+<p:sld xmlns:a="http://schemas.openxmlformats.org/drawingml/2006/main" xmlns:r="http://schemas.openxmlformats.org/officeDocument/2006/relationships" xmlns:p="http://schemas.openxmlformats.org/presentationml/2006/main">
+  <p:cSld>
+    <p:spTree>
+      <p:nvGrpSpPr>
+        <p:cNvPr id="1" name=""/>
+        <p:cNvGrpSpPr/>
+        <p:nvPr/>
+      </p:nvGrpSpPr>
+      <p:grpSpPr>
+        <a:xfrm>
+          <a:off x="0" y="0"/>
+          <a:ext cx="0" cy="0"/>
+          <a:chOff x="0" y="0"/>
+          <a:chExt cx="0" cy="0"/>
+        </a:xfrm>
+      </p:grpSpPr>
+      <p:sp>
+        <p:nvSpPr>
+          <p:cNvPr id="4" name="CaixaDeTexto 3"/>
+          <p:cNvSpPr txBox="1"/>
+          <p:nvPr/>
+        </p:nvSpPr>
+        <p:spPr>
+          <a:xfrm>
+            <a:off x="1188310" y="1005840"/>
+            <a:ext cx="9849803" cy="4985980"/>
+          </a:xfrm>
+          <a:prstGeom prst="rect">
+            <a:avLst/>
+          </a:prstGeom>
+          <a:noFill/>
+        </p:spPr>
+        <p:txBody>
+          <a:bodyPr wrap="square" rtlCol="0">
+            <a:spAutoFit/>
+          </a:bodyPr>
+          <a:lstStyle/>
+          <a:p>
+            <a:r>
+              <a:rPr lang="pt-BR" sz="1500" dirty="0"/>
+              <a:t>Com foco no fomento da transparência e melhores práticas para atender ao cidadão, o Estado de Minas Gerais disponibiliza seção específica para divulgar dados referentes à COVID-19 no estado de Minas</a:t>
+            </a:r>
+            <a:r>
+              <a:rPr lang="pt-BR" sz="1500" dirty="0" smtClean="0"/>
+              <a:t>.</a:t>
+            </a:r>
+          </a:p>
+          <a:p>
+            <a:endParaRPr lang="pt-BR" sz="1500" dirty="0"/>
+          </a:p>
+          <a:p>
+            <a:r>
+              <a:rPr lang="pt-BR" sz="1500" dirty="0"/>
+              <a:t>As informações disponíveis na nova seção são relativas a</a:t>
+            </a:r>
+            <a:r>
+              <a:rPr lang="pt-BR" sz="1500" dirty="0" smtClean="0"/>
+              <a:t>:</a:t>
+            </a:r>
+          </a:p>
+          <a:p>
+            <a:r>
+              <a:rPr lang="pt-BR" sz="1500" dirty="0" smtClean="0"/>
+              <a:t>•</a:t>
+            </a:r>
+            <a:r>
+              <a:rPr lang="pt-BR" sz="1500" dirty="0"/>
+              <a:t> </a:t>
+            </a:r>
+            <a:r>
+              <a:rPr lang="pt-BR" sz="1500" dirty="0">
+                <a:hlinkClick r:id="rId2"/>
+              </a:rPr>
+              <a:t>Legislação e Normativos</a:t>
+            </a:r>
+            <a:r>
+              <a:rPr lang="pt-BR" sz="1500" dirty="0"/>
+              <a:t> relacionados às medidas de proteção e combate à COVID-19;</a:t>
+            </a:r>
+            <a:br>
+              <a:rPr lang="pt-BR" sz="1500" dirty="0"/>
+            </a:br>
+            <a:r>
+              <a:rPr lang="pt-BR" sz="1500" dirty="0"/>
+              <a:t>•</a:t>
+            </a:r>
+            <a:r>
+              <a:rPr lang="pt-BR" sz="1500" dirty="0">
+                <a:hlinkClick r:id="rId3"/>
+              </a:rPr>
+              <a:t> Dados abertos</a:t>
+            </a:r>
+            <a:r>
+              <a:rPr lang="pt-BR" sz="1500" dirty="0"/>
+              <a:t>: todos os conjuntos de dados relacionados a COVID-19 ;</a:t>
+            </a:r>
+            <a:br>
+              <a:rPr lang="pt-BR" sz="1500" dirty="0"/>
+            </a:br>
+            <a:r>
+              <a:rPr lang="pt-BR" sz="1500" dirty="0"/>
+              <a:t>•</a:t>
+            </a:r>
+            <a:r>
+              <a:rPr lang="pt-BR" sz="1500" dirty="0">
+                <a:hlinkClick r:id="rId4"/>
+              </a:rPr>
+              <a:t> Conselho de Transparência e Combate à Corrupção</a:t>
+            </a:r>
+            <a:r>
+              <a:rPr lang="pt-BR" sz="1500" dirty="0"/>
+              <a:t>: informações sobre o Conselho de Transparência e Combate à Corrupção e sua atuação no monitoramento e avaliação das ações relacionadas ao enfrentamento da COVID-19; e</a:t>
+            </a:r>
+            <a:br>
+              <a:rPr lang="pt-BR" sz="1500" dirty="0"/>
+            </a:br>
+            <a:r>
+              <a:rPr lang="pt-BR" sz="1500" dirty="0"/>
+              <a:t>• </a:t>
+            </a:r>
+            <a:r>
+              <a:rPr lang="pt-BR" sz="1500" dirty="0">
+                <a:hlinkClick r:id="rId5"/>
+              </a:rPr>
+              <a:t>Dados Epidemiológicos:</a:t>
+            </a:r>
+            <a:r>
+              <a:rPr lang="pt-BR" sz="1500" dirty="0"/>
+              <a:t> informações relativas ao boletim epidemiológicos, painel de monitoramento de casos, orientações para o cidadão e outros dados relacionados ao </a:t>
+            </a:r>
+            <a:r>
+              <a:rPr lang="pt-BR" sz="1500" dirty="0" err="1"/>
+              <a:t>coronavírus</a:t>
+            </a:r>
+            <a:r>
+              <a:rPr lang="pt-BR" sz="1500" dirty="0"/>
+              <a:t> divulgadas pela Secretaria de Estado da Saúde</a:t>
+            </a:r>
+            <a:r>
+              <a:rPr lang="pt-BR" sz="1500" dirty="0" smtClean="0"/>
+              <a:t>.</a:t>
+            </a:r>
+          </a:p>
+          <a:p>
+            <a:r>
+              <a:rPr lang="pt-BR" sz="1500" dirty="0"/>
+              <a:t>•</a:t>
+            </a:r>
+            <a:r>
+              <a:rPr lang="pt-BR" sz="1500" dirty="0">
+                <a:solidFill>
+                  <a:schemeClr val="accent1">
+                    <a:lumMod val="75000"/>
+                  </a:schemeClr>
+                </a:solidFill>
+              </a:rPr>
+              <a:t> </a:t>
+            </a:r>
+            <a:r>
+              <a:rPr lang="pt-BR" sz="1500" u="sng" dirty="0" smtClean="0">
+                <a:solidFill>
+                  <a:schemeClr val="accent1">
+                    <a:lumMod val="75000"/>
+                  </a:schemeClr>
+                </a:solidFill>
+              </a:rPr>
+              <a:t>Doações</a:t>
+            </a:r>
+            <a:r>
+              <a:rPr lang="pt-BR" sz="1500" dirty="0"/>
+              <a:t> </a:t>
+            </a:r>
+            <a:r>
+              <a:rPr lang="pt-BR" sz="1500" dirty="0" err="1" smtClean="0"/>
+              <a:t>xxxxxxxxx</a:t>
+            </a:r>
+            <a:endParaRPr lang="pt-BR" sz="1500" dirty="0" smtClean="0"/>
+          </a:p>
+          <a:p>
+            <a:r>
+              <a:rPr lang="pt-BR" sz="1500" dirty="0"/>
+              <a:t>• </a:t>
+            </a:r>
+            <a:r>
+              <a:rPr lang="pt-BR" sz="1500" u="sng" dirty="0" smtClean="0">
+                <a:solidFill>
+                  <a:schemeClr val="accent1">
+                    <a:lumMod val="75000"/>
+                  </a:schemeClr>
+                </a:solidFill>
+              </a:rPr>
+              <a:t>Medidas </a:t>
+            </a:r>
+            <a:r>
+              <a:rPr lang="pt-BR" sz="1500" u="sng" dirty="0">
+                <a:solidFill>
+                  <a:schemeClr val="accent1">
+                    <a:lumMod val="75000"/>
+                  </a:schemeClr>
+                </a:solidFill>
+              </a:rPr>
+              <a:t>de estímulo econômico e proteção social </a:t>
+            </a:r>
+            <a:r>
+              <a:rPr lang="pt-BR" sz="1500" dirty="0" err="1" smtClean="0"/>
+              <a:t>xxxxxxxxxx</a:t>
+            </a:r>
+            <a:endParaRPr lang="pt-BR" sz="1500" dirty="0" smtClean="0"/>
+          </a:p>
+          <a:p>
+            <a:endParaRPr lang="pt-BR" sz="1500" dirty="0"/>
+          </a:p>
+          <a:p>
+            <a:endParaRPr lang="pt-BR" sz="1500" dirty="0"/>
+          </a:p>
+          <a:p>
+            <a:r>
+              <a:rPr lang="pt-BR" sz="1500" dirty="0"/>
+              <a:t>É possível, ainda, solicitar informações relativas à pandemia por meio do</a:t>
+            </a:r>
+            <a:r>
+              <a:rPr lang="pt-BR" sz="1500" dirty="0">
+                <a:hlinkClick r:id="rId6"/>
+              </a:rPr>
+              <a:t> Acesso à Informação </a:t>
+            </a:r>
+            <a:r>
+              <a:rPr lang="pt-BR" sz="1500" dirty="0"/>
+              <a:t>e realizar denúncias, reclamações e sugestões por meio do canal exclusivo da </a:t>
+            </a:r>
+            <a:r>
+              <a:rPr lang="pt-BR" sz="1500" dirty="0">
+                <a:hlinkClick r:id="rId7"/>
+              </a:rPr>
+              <a:t>Ouvidoria</a:t>
+            </a:r>
+            <a:r>
+              <a:rPr lang="pt-BR" sz="1500" dirty="0" smtClean="0"/>
+              <a:t>.</a:t>
+            </a:r>
+          </a:p>
+          <a:p>
+            <a:endParaRPr lang="pt-BR" sz="1500" dirty="0"/>
+          </a:p>
+          <a:p>
+            <a:r>
+              <a:rPr lang="pt-BR" sz="1500" dirty="0"/>
+              <a:t>As informações sobre as contratações e aquisições para enfrentar a emergência de saúde pública decorrente da pandemia da COVID-19 estão dispostas no Portal de Transparência de três formas, para conhecê-las </a:t>
+            </a:r>
+            <a:r>
+              <a:rPr lang="pt-BR" sz="1500" dirty="0">
+                <a:hlinkClick r:id="rId8"/>
+              </a:rPr>
+              <a:t>clique aqui</a:t>
+            </a:r>
+            <a:r>
+              <a:rPr lang="pt-BR" sz="1500" dirty="0"/>
+              <a:t>.</a:t>
+            </a:r>
+          </a:p>
+          <a:p>
+            <a:endParaRPr lang="pt-BR" sz="1500" dirty="0"/>
+          </a:p>
+          <a:p>
+            <a:endParaRPr lang="pt-BR" dirty="0"/>
+          </a:p>
+        </p:txBody>
+      </p:sp>
+    </p:spTree>
+    <p:extLst>
+      <p:ext uri="{BB962C8B-B14F-4D97-AF65-F5344CB8AC3E}">
+        <p14:creationId xmlns:p14="http://schemas.microsoft.com/office/powerpoint/2010/main" val="2854600927"/>
       </p:ext>
     </p:extLst>
   </p:cSld>

</xml_diff>

<commit_message>
Atualiza documento de especificação - Consulta COVID
</commit_message>
<xml_diff>
--- a/static/pagina-inicial-espec-covid19.pptx
+++ b/static/pagina-inicial-espec-covid19.pptx
@@ -275,7 +275,7 @@
           <a:p>
             <a:fld id="{0DAC32FC-DBAC-4007-937A-15B4E69A3744}" type="datetimeFigureOut">
               <a:rPr lang="pt-BR" smtClean="0"/>
-              <a:t>15/07/2020</a:t>
+              <a:t>16/07/2020</a:t>
             </a:fld>
             <a:endParaRPr lang="pt-BR"/>
           </a:p>
@@ -445,7 +445,7 @@
           <a:p>
             <a:fld id="{0DAC32FC-DBAC-4007-937A-15B4E69A3744}" type="datetimeFigureOut">
               <a:rPr lang="pt-BR" smtClean="0"/>
-              <a:t>15/07/2020</a:t>
+              <a:t>16/07/2020</a:t>
             </a:fld>
             <a:endParaRPr lang="pt-BR"/>
           </a:p>
@@ -625,7 +625,7 @@
           <a:p>
             <a:fld id="{0DAC32FC-DBAC-4007-937A-15B4E69A3744}" type="datetimeFigureOut">
               <a:rPr lang="pt-BR" smtClean="0"/>
-              <a:t>15/07/2020</a:t>
+              <a:t>16/07/2020</a:t>
             </a:fld>
             <a:endParaRPr lang="pt-BR"/>
           </a:p>
@@ -795,7 +795,7 @@
           <a:p>
             <a:fld id="{0DAC32FC-DBAC-4007-937A-15B4E69A3744}" type="datetimeFigureOut">
               <a:rPr lang="pt-BR" smtClean="0"/>
-              <a:t>15/07/2020</a:t>
+              <a:t>16/07/2020</a:t>
             </a:fld>
             <a:endParaRPr lang="pt-BR"/>
           </a:p>
@@ -1041,7 +1041,7 @@
           <a:p>
             <a:fld id="{0DAC32FC-DBAC-4007-937A-15B4E69A3744}" type="datetimeFigureOut">
               <a:rPr lang="pt-BR" smtClean="0"/>
-              <a:t>15/07/2020</a:t>
+              <a:t>16/07/2020</a:t>
             </a:fld>
             <a:endParaRPr lang="pt-BR"/>
           </a:p>
@@ -1273,7 +1273,7 @@
           <a:p>
             <a:fld id="{0DAC32FC-DBAC-4007-937A-15B4E69A3744}" type="datetimeFigureOut">
               <a:rPr lang="pt-BR" smtClean="0"/>
-              <a:t>15/07/2020</a:t>
+              <a:t>16/07/2020</a:t>
             </a:fld>
             <a:endParaRPr lang="pt-BR"/>
           </a:p>
@@ -1640,7 +1640,7 @@
           <a:p>
             <a:fld id="{0DAC32FC-DBAC-4007-937A-15B4E69A3744}" type="datetimeFigureOut">
               <a:rPr lang="pt-BR" smtClean="0"/>
-              <a:t>15/07/2020</a:t>
+              <a:t>16/07/2020</a:t>
             </a:fld>
             <a:endParaRPr lang="pt-BR"/>
           </a:p>
@@ -1758,7 +1758,7 @@
           <a:p>
             <a:fld id="{0DAC32FC-DBAC-4007-937A-15B4E69A3744}" type="datetimeFigureOut">
               <a:rPr lang="pt-BR" smtClean="0"/>
-              <a:t>15/07/2020</a:t>
+              <a:t>16/07/2020</a:t>
             </a:fld>
             <a:endParaRPr lang="pt-BR"/>
           </a:p>
@@ -1853,7 +1853,7 @@
           <a:p>
             <a:fld id="{0DAC32FC-DBAC-4007-937A-15B4E69A3744}" type="datetimeFigureOut">
               <a:rPr lang="pt-BR" smtClean="0"/>
-              <a:t>15/07/2020</a:t>
+              <a:t>16/07/2020</a:t>
             </a:fld>
             <a:endParaRPr lang="pt-BR"/>
           </a:p>
@@ -2130,7 +2130,7 @@
           <a:p>
             <a:fld id="{0DAC32FC-DBAC-4007-937A-15B4E69A3744}" type="datetimeFigureOut">
               <a:rPr lang="pt-BR" smtClean="0"/>
-              <a:t>15/07/2020</a:t>
+              <a:t>16/07/2020</a:t>
             </a:fld>
             <a:endParaRPr lang="pt-BR"/>
           </a:p>
@@ -2383,7 +2383,7 @@
           <a:p>
             <a:fld id="{0DAC32FC-DBAC-4007-937A-15B4E69A3744}" type="datetimeFigureOut">
               <a:rPr lang="pt-BR" smtClean="0"/>
-              <a:t>15/07/2020</a:t>
+              <a:t>16/07/2020</a:t>
             </a:fld>
             <a:endParaRPr lang="pt-BR"/>
           </a:p>
@@ -2596,7 +2596,7 @@
           <a:p>
             <a:fld id="{0DAC32FC-DBAC-4007-937A-15B4E69A3744}" type="datetimeFigureOut">
               <a:rPr lang="pt-BR" smtClean="0"/>
-              <a:t>15/07/2020</a:t>
+              <a:t>16/07/2020</a:t>
             </a:fld>
             <a:endParaRPr lang="pt-BR"/>
           </a:p>
@@ -3927,7 +3927,7 @@
           <p:spPr>
             <a:xfrm>
               <a:off x="1704703" y="2404877"/>
-              <a:ext cx="8438606" cy="923330"/>
+              <a:ext cx="8438606" cy="707886"/>
             </a:xfrm>
             <a:prstGeom prst="rect">
               <a:avLst/>
@@ -3979,7 +3979,7 @@
                 <a:t> COVID-19 </a:t>
               </a:r>
               <a:r>
-                <a:rPr lang="pt-BR" sz="1000" dirty="0" smtClean="0">
+                <a:rPr lang="pt-BR" sz="1000" dirty="0">
                   <a:solidFill>
                     <a:schemeClr val="tx1">
                       <a:lumMod val="50000"/>
@@ -3987,8 +3987,27 @@
                     </a:schemeClr>
                   </a:solidFill>
                 </a:rPr>
-                <a:t>/ Legislação e Normativos</a:t>
+                <a:t>/ Ouvidoria </a:t>
               </a:r>
+              <a:r>
+                <a:rPr lang="pt-BR" sz="1000" dirty="0" err="1">
+                  <a:solidFill>
+                    <a:schemeClr val="tx1">
+                      <a:lumMod val="50000"/>
+                      <a:lumOff val="50000"/>
+                    </a:schemeClr>
+                  </a:solidFill>
+                </a:rPr>
+                <a:t>Coronavírus</a:t>
+              </a:r>
+              <a:endParaRPr lang="pt-BR" sz="1000" dirty="0" smtClean="0">
+                <a:solidFill>
+                  <a:schemeClr val="tx1">
+                    <a:lumMod val="50000"/>
+                    <a:lumOff val="50000"/>
+                  </a:schemeClr>
+                </a:solidFill>
+              </a:endParaRPr>
             </a:p>
             <a:p>
               <a:endParaRPr lang="pt-BR" sz="1000" dirty="0">
@@ -4022,17 +4041,6 @@
                   </a:schemeClr>
                 </a:solidFill>
               </a:endParaRPr>
-            </a:p>
-            <a:p>
-              <a:pPr marL="742950" lvl="1" indent="-285750">
-                <a:buFont typeface="Arial" panose="020B0604020202020204" pitchFamily="34" charset="0"/>
-                <a:buChar char="•"/>
-              </a:pPr>
-              <a:r>
-                <a:rPr lang="pt-BR" sz="1400" dirty="0" smtClean="0"/>
-                <a:t>Lei Estadual nº 23.640/20 </a:t>
-              </a:r>
-              <a:endParaRPr lang="pt-BR" sz="1400" dirty="0"/>
             </a:p>
           </p:txBody>
         </p:sp>
@@ -4068,8 +4076,8 @@
           </p:nvSpPr>
           <p:spPr>
             <a:xfrm>
-              <a:off x="3879669" y="1750422"/>
-              <a:ext cx="3905794" cy="369332"/>
+              <a:off x="3148149" y="1812150"/>
+              <a:ext cx="5577839" cy="369332"/>
             </a:xfrm>
             <a:prstGeom prst="rect">
               <a:avLst/>
@@ -4084,12 +4092,20 @@
             <a:p>
               <a:pPr algn="ctr"/>
               <a:r>
-                <a:rPr lang="pt-BR" b="1" dirty="0" smtClean="0">
+                <a:rPr lang="pt-BR" b="1" dirty="0">
                   <a:solidFill>
                     <a:schemeClr val="bg1"/>
                   </a:solidFill>
                 </a:rPr>
-                <a:t>Legislação e Normativos</a:t>
+                <a:t>Ouvidoria </a:t>
+              </a:r>
+              <a:r>
+                <a:rPr lang="pt-BR" b="1" dirty="0" err="1">
+                  <a:solidFill>
+                    <a:schemeClr val="bg1"/>
+                  </a:solidFill>
+                </a:rPr>
+                <a:t>Coronavírus</a:t>
               </a:r>
               <a:endParaRPr lang="pt-BR" b="1" dirty="0">
                 <a:solidFill>
@@ -4449,15 +4465,7 @@
                     <a:schemeClr val="bg1"/>
                   </a:solidFill>
                 </a:rPr>
-                <a:t>Doaç</a:t>
-              </a:r>
-              <a:r>
-                <a:rPr lang="pt-BR" sz="1600" dirty="0" smtClean="0">
-                  <a:solidFill>
-                    <a:schemeClr val="bg1"/>
-                  </a:solidFill>
-                </a:rPr>
-                <a:t>ões</a:t>
+                <a:t>Doações</a:t>
               </a:r>
               <a:endParaRPr lang="pt-BR" sz="1400" dirty="0">
                 <a:solidFill>

</xml_diff>